<commit_message>
branch into system elaboration
</commit_message>
<xml_diff>
--- a/Graphs.pptx
+++ b/Graphs.pptx
@@ -261,7 +261,7 @@
           <a:p>
             <a:fld id="{F1060869-B550-1243-84A8-BC75E6A20A47}" type="datetimeFigureOut">
               <a:rPr lang="en-TW" smtClean="0"/>
-              <a:t>2024/5/12</a:t>
+              <a:t>2024/5/16</a:t>
             </a:fld>
             <a:endParaRPr lang="en-TW"/>
           </a:p>
@@ -461,7 +461,7 @@
           <a:p>
             <a:fld id="{F1060869-B550-1243-84A8-BC75E6A20A47}" type="datetimeFigureOut">
               <a:rPr lang="en-TW" smtClean="0"/>
-              <a:t>2024/5/12</a:t>
+              <a:t>2024/5/16</a:t>
             </a:fld>
             <a:endParaRPr lang="en-TW"/>
           </a:p>
@@ -671,7 +671,7 @@
           <a:p>
             <a:fld id="{F1060869-B550-1243-84A8-BC75E6A20A47}" type="datetimeFigureOut">
               <a:rPr lang="en-TW" smtClean="0"/>
-              <a:t>2024/5/12</a:t>
+              <a:t>2024/5/16</a:t>
             </a:fld>
             <a:endParaRPr lang="en-TW"/>
           </a:p>
@@ -871,7 +871,7 @@
           <a:p>
             <a:fld id="{F1060869-B550-1243-84A8-BC75E6A20A47}" type="datetimeFigureOut">
               <a:rPr lang="en-TW" smtClean="0"/>
-              <a:t>2024/5/12</a:t>
+              <a:t>2024/5/16</a:t>
             </a:fld>
             <a:endParaRPr lang="en-TW"/>
           </a:p>
@@ -1147,7 +1147,7 @@
           <a:p>
             <a:fld id="{F1060869-B550-1243-84A8-BC75E6A20A47}" type="datetimeFigureOut">
               <a:rPr lang="en-TW" smtClean="0"/>
-              <a:t>2024/5/12</a:t>
+              <a:t>2024/5/16</a:t>
             </a:fld>
             <a:endParaRPr lang="en-TW"/>
           </a:p>
@@ -1415,7 +1415,7 @@
           <a:p>
             <a:fld id="{F1060869-B550-1243-84A8-BC75E6A20A47}" type="datetimeFigureOut">
               <a:rPr lang="en-TW" smtClean="0"/>
-              <a:t>2024/5/12</a:t>
+              <a:t>2024/5/16</a:t>
             </a:fld>
             <a:endParaRPr lang="en-TW"/>
           </a:p>
@@ -1830,7 +1830,7 @@
           <a:p>
             <a:fld id="{F1060869-B550-1243-84A8-BC75E6A20A47}" type="datetimeFigureOut">
               <a:rPr lang="en-TW" smtClean="0"/>
-              <a:t>2024/5/12</a:t>
+              <a:t>2024/5/16</a:t>
             </a:fld>
             <a:endParaRPr lang="en-TW"/>
           </a:p>
@@ -1972,7 +1972,7 @@
           <a:p>
             <a:fld id="{F1060869-B550-1243-84A8-BC75E6A20A47}" type="datetimeFigureOut">
               <a:rPr lang="en-TW" smtClean="0"/>
-              <a:t>2024/5/12</a:t>
+              <a:t>2024/5/16</a:t>
             </a:fld>
             <a:endParaRPr lang="en-TW"/>
           </a:p>
@@ -2085,7 +2085,7 @@
           <a:p>
             <a:fld id="{F1060869-B550-1243-84A8-BC75E6A20A47}" type="datetimeFigureOut">
               <a:rPr lang="en-TW" smtClean="0"/>
-              <a:t>2024/5/12</a:t>
+              <a:t>2024/5/16</a:t>
             </a:fld>
             <a:endParaRPr lang="en-TW"/>
           </a:p>
@@ -2398,7 +2398,7 @@
           <a:p>
             <a:fld id="{F1060869-B550-1243-84A8-BC75E6A20A47}" type="datetimeFigureOut">
               <a:rPr lang="en-TW" smtClean="0"/>
-              <a:t>2024/5/12</a:t>
+              <a:t>2024/5/16</a:t>
             </a:fld>
             <a:endParaRPr lang="en-TW"/>
           </a:p>
@@ -2687,7 +2687,7 @@
           <a:p>
             <a:fld id="{F1060869-B550-1243-84A8-BC75E6A20A47}" type="datetimeFigureOut">
               <a:rPr lang="en-TW" smtClean="0"/>
-              <a:t>2024/5/12</a:t>
+              <a:t>2024/5/16</a:t>
             </a:fld>
             <a:endParaRPr lang="en-TW"/>
           </a:p>
@@ -2930,7 +2930,7 @@
           <a:p>
             <a:fld id="{F1060869-B550-1243-84A8-BC75E6A20A47}" type="datetimeFigureOut">
               <a:rPr lang="en-TW" smtClean="0"/>
-              <a:t>2024/5/12</a:t>
+              <a:t>2024/5/16</a:t>
             </a:fld>
             <a:endParaRPr lang="en-TW"/>
           </a:p>
@@ -3701,7 +3701,7 @@
         </p:nvSpPr>
         <p:spPr>
           <a:xfrm>
-            <a:off x="6987398" y="2134495"/>
+            <a:off x="7005417" y="2134495"/>
             <a:ext cx="2063578" cy="307777"/>
           </a:xfrm>
           <a:prstGeom prst="rect">
@@ -4321,7 +4321,7 @@
         <p:spPr>
           <a:xfrm flipV="1">
             <a:off x="6722075" y="2288384"/>
-            <a:ext cx="265323" cy="4011"/>
+            <a:ext cx="283342" cy="4011"/>
           </a:xfrm>
           <a:prstGeom prst="straightConnector1">
             <a:avLst/>
@@ -4363,8 +4363,8 @@
         </p:nvCxnSpPr>
         <p:spPr>
           <a:xfrm>
-            <a:off x="9050976" y="2288384"/>
-            <a:ext cx="1029465" cy="6431"/>
+            <a:off x="9068995" y="2288384"/>
+            <a:ext cx="894135" cy="6430"/>
           </a:xfrm>
           <a:prstGeom prst="straightConnector1">
             <a:avLst/>
@@ -4452,8 +4452,8 @@
         </p:nvCxnSpPr>
         <p:spPr>
           <a:xfrm rot="5400000">
-            <a:off x="8285551" y="1294977"/>
-            <a:ext cx="1530850" cy="3838302"/>
+            <a:off x="8226896" y="1353632"/>
+            <a:ext cx="1530851" cy="3720991"/>
           </a:xfrm>
           <a:prstGeom prst="bentConnector3">
             <a:avLst>
@@ -4672,7 +4672,7 @@
         </p:nvSpPr>
         <p:spPr>
           <a:xfrm>
-            <a:off x="10080441" y="2140926"/>
+            <a:off x="9963130" y="2140925"/>
             <a:ext cx="1779372" cy="307777"/>
           </a:xfrm>
           <a:prstGeom prst="rect">

</xml_diff>